<commit_message>
novas alterações -> Menu flutuante
</commit_message>
<xml_diff>
--- a/Protótipo/Apresentação GameMania.pptx
+++ b/Protótipo/Apresentação GameMania.pptx
@@ -247,7 +247,8 @@
           <a:p>
             <a:fld id="{8A801D8C-650B-489D-879F-A51F9ABFB6C7}" type="datetimeFigureOut">
               <a:rPr lang="pt-BR" smtClean="0"/>
-              <a:t>27/02/2022</a:t>
+              <a:pPr/>
+              <a:t>25/08/2022</a:t>
             </a:fld>
             <a:endParaRPr lang="pt-BR"/>
           </a:p>
@@ -293,6 +294,7 @@
           <a:p>
             <a:fld id="{7BDFF5A0-8C34-4381-BE51-F8C69FDA0AE0}" type="slidenum">
               <a:rPr lang="pt-BR" smtClean="0"/>
+              <a:pPr/>
               <a:t>‹nº›</a:t>
             </a:fld>
             <a:endParaRPr lang="pt-BR"/>
@@ -560,7 +562,8 @@
           <a:p>
             <a:fld id="{8A801D8C-650B-489D-879F-A51F9ABFB6C7}" type="datetimeFigureOut">
               <a:rPr lang="pt-BR" smtClean="0"/>
-              <a:t>27/02/2022</a:t>
+              <a:pPr/>
+              <a:t>25/08/2022</a:t>
             </a:fld>
             <a:endParaRPr lang="pt-BR"/>
           </a:p>
@@ -606,6 +609,7 @@
           <a:p>
             <a:fld id="{7BDFF5A0-8C34-4381-BE51-F8C69FDA0AE0}" type="slidenum">
               <a:rPr lang="pt-BR" smtClean="0"/>
+              <a:pPr/>
               <a:t>‹nº›</a:t>
             </a:fld>
             <a:endParaRPr lang="pt-BR"/>
@@ -745,7 +749,8 @@
           <a:p>
             <a:fld id="{8A801D8C-650B-489D-879F-A51F9ABFB6C7}" type="datetimeFigureOut">
               <a:rPr lang="pt-BR" smtClean="0"/>
-              <a:t>27/02/2022</a:t>
+              <a:pPr/>
+              <a:t>25/08/2022</a:t>
             </a:fld>
             <a:endParaRPr lang="pt-BR"/>
           </a:p>
@@ -791,6 +796,7 @@
           <a:p>
             <a:fld id="{7BDFF5A0-8C34-4381-BE51-F8C69FDA0AE0}" type="slidenum">
               <a:rPr lang="pt-BR" smtClean="0"/>
+              <a:pPr/>
               <a:t>‹nº›</a:t>
             </a:fld>
             <a:endParaRPr lang="pt-BR"/>
@@ -920,7 +926,8 @@
           <a:p>
             <a:fld id="{8A801D8C-650B-489D-879F-A51F9ABFB6C7}" type="datetimeFigureOut">
               <a:rPr lang="pt-BR" smtClean="0"/>
-              <a:t>27/02/2022</a:t>
+              <a:pPr/>
+              <a:t>25/08/2022</a:t>
             </a:fld>
             <a:endParaRPr lang="pt-BR"/>
           </a:p>
@@ -966,6 +973,7 @@
           <a:p>
             <a:fld id="{7BDFF5A0-8C34-4381-BE51-F8C69FDA0AE0}" type="slidenum">
               <a:rPr lang="pt-BR" smtClean="0"/>
+              <a:pPr/>
               <a:t>‹nº›</a:t>
             </a:fld>
             <a:endParaRPr lang="pt-BR"/>
@@ -1188,7 +1196,8 @@
           <a:p>
             <a:fld id="{8A801D8C-650B-489D-879F-A51F9ABFB6C7}" type="datetimeFigureOut">
               <a:rPr lang="pt-BR" smtClean="0"/>
-              <a:t>27/02/2022</a:t>
+              <a:pPr/>
+              <a:t>25/08/2022</a:t>
             </a:fld>
             <a:endParaRPr lang="pt-BR"/>
           </a:p>
@@ -1234,6 +1243,7 @@
           <a:p>
             <a:fld id="{7BDFF5A0-8C34-4381-BE51-F8C69FDA0AE0}" type="slidenum">
               <a:rPr lang="pt-BR" smtClean="0"/>
+              <a:pPr/>
               <a:t>‹nº›</a:t>
             </a:fld>
             <a:endParaRPr lang="pt-BR"/>
@@ -1656,7 +1666,8 @@
           <a:p>
             <a:fld id="{8A801D8C-650B-489D-879F-A51F9ABFB6C7}" type="datetimeFigureOut">
               <a:rPr lang="pt-BR" smtClean="0"/>
-              <a:t>27/02/2022</a:t>
+              <a:pPr/>
+              <a:t>25/08/2022</a:t>
             </a:fld>
             <a:endParaRPr lang="pt-BR"/>
           </a:p>
@@ -1702,6 +1713,7 @@
           <a:p>
             <a:fld id="{7BDFF5A0-8C34-4381-BE51-F8C69FDA0AE0}" type="slidenum">
               <a:rPr lang="pt-BR" smtClean="0"/>
+              <a:pPr/>
               <a:t>‹nº›</a:t>
             </a:fld>
             <a:endParaRPr lang="pt-BR"/>
@@ -2145,7 +2157,8 @@
           <a:p>
             <a:fld id="{8A801D8C-650B-489D-879F-A51F9ABFB6C7}" type="datetimeFigureOut">
               <a:rPr lang="pt-BR" smtClean="0"/>
-              <a:t>27/02/2022</a:t>
+              <a:pPr/>
+              <a:t>25/08/2022</a:t>
             </a:fld>
             <a:endParaRPr lang="pt-BR"/>
           </a:p>
@@ -2191,6 +2204,7 @@
           <a:p>
             <a:fld id="{7BDFF5A0-8C34-4381-BE51-F8C69FDA0AE0}" type="slidenum">
               <a:rPr lang="pt-BR" smtClean="0"/>
+              <a:pPr/>
               <a:t>‹nº›</a:t>
             </a:fld>
             <a:endParaRPr lang="pt-BR"/>
@@ -2271,7 +2285,8 @@
           <a:p>
             <a:fld id="{8A801D8C-650B-489D-879F-A51F9ABFB6C7}" type="datetimeFigureOut">
               <a:rPr lang="pt-BR" smtClean="0"/>
-              <a:t>27/02/2022</a:t>
+              <a:pPr/>
+              <a:t>25/08/2022</a:t>
             </a:fld>
             <a:endParaRPr lang="pt-BR"/>
           </a:p>
@@ -2317,6 +2332,7 @@
           <a:p>
             <a:fld id="{7BDFF5A0-8C34-4381-BE51-F8C69FDA0AE0}" type="slidenum">
               <a:rPr lang="pt-BR" smtClean="0"/>
+              <a:pPr/>
               <a:t>‹nº›</a:t>
             </a:fld>
             <a:endParaRPr lang="pt-BR"/>
@@ -2415,7 +2431,8 @@
           <a:p>
             <a:fld id="{8A801D8C-650B-489D-879F-A51F9ABFB6C7}" type="datetimeFigureOut">
               <a:rPr lang="pt-BR" smtClean="0"/>
-              <a:t>27/02/2022</a:t>
+              <a:pPr/>
+              <a:t>25/08/2022</a:t>
             </a:fld>
             <a:endParaRPr lang="pt-BR"/>
           </a:p>
@@ -2461,6 +2478,7 @@
           <a:p>
             <a:fld id="{7BDFF5A0-8C34-4381-BE51-F8C69FDA0AE0}" type="slidenum">
               <a:rPr lang="pt-BR" smtClean="0"/>
+              <a:pPr/>
               <a:t>‹nº›</a:t>
             </a:fld>
             <a:endParaRPr lang="pt-BR"/>
@@ -2737,7 +2755,8 @@
           <a:p>
             <a:fld id="{8A801D8C-650B-489D-879F-A51F9ABFB6C7}" type="datetimeFigureOut">
               <a:rPr lang="pt-BR" smtClean="0"/>
-              <a:t>27/02/2022</a:t>
+              <a:pPr/>
+              <a:t>25/08/2022</a:t>
             </a:fld>
             <a:endParaRPr lang="pt-BR"/>
           </a:p>
@@ -2783,6 +2802,7 @@
           <a:p>
             <a:fld id="{7BDFF5A0-8C34-4381-BE51-F8C69FDA0AE0}" type="slidenum">
               <a:rPr lang="pt-BR" smtClean="0"/>
+              <a:pPr/>
               <a:t>‹nº›</a:t>
             </a:fld>
             <a:endParaRPr lang="pt-BR"/>
@@ -2871,7 +2891,8 @@
           <a:p>
             <a:fld id="{8A801D8C-650B-489D-879F-A51F9ABFB6C7}" type="datetimeFigureOut">
               <a:rPr lang="pt-BR" smtClean="0"/>
-              <a:t>27/02/2022</a:t>
+              <a:pPr/>
+              <a:t>25/08/2022</a:t>
             </a:fld>
             <a:endParaRPr lang="pt-BR"/>
           </a:p>
@@ -2917,6 +2938,7 @@
           <a:p>
             <a:fld id="{7BDFF5A0-8C34-4381-BE51-F8C69FDA0AE0}" type="slidenum">
               <a:rPr lang="pt-BR" smtClean="0"/>
+              <a:pPr/>
               <a:t>‹nº›</a:t>
             </a:fld>
             <a:endParaRPr lang="pt-BR"/>
@@ -3652,7 +3674,8 @@
           <a:p>
             <a:fld id="{8A801D8C-650B-489D-879F-A51F9ABFB6C7}" type="datetimeFigureOut">
               <a:rPr lang="pt-BR" smtClean="0"/>
-              <a:t>27/02/2022</a:t>
+              <a:pPr/>
+              <a:t>25/08/2022</a:t>
             </a:fld>
             <a:endParaRPr lang="pt-BR"/>
           </a:p>
@@ -3736,6 +3759,7 @@
           <a:p>
             <a:fld id="{7BDFF5A0-8C34-4381-BE51-F8C69FDA0AE0}" type="slidenum">
               <a:rPr lang="pt-BR" smtClean="0"/>
+              <a:pPr/>
               <a:t>‹nº›</a:t>
             </a:fld>
             <a:endParaRPr lang="pt-BR"/>
@@ -4671,19 +4695,7 @@
               <a:rPr lang="pt-BR" sz="2000" dirty="0" smtClean="0">
                 <a:latin typeface="Baskerville Old Face" pitchFamily="18" charset="0"/>
               </a:rPr>
-              <a:t> Foi o primeiro layout a ser feito e o que levou mais tempo para produção, por ter sido </a:t>
-            </a:r>
-            <a:r>
-              <a:rPr lang="pt-BR" sz="2000" dirty="0" smtClean="0">
-                <a:latin typeface="Baskerville Old Face" pitchFamily="18" charset="0"/>
-              </a:rPr>
-              <a:t>totalmente </a:t>
-            </a:r>
-            <a:r>
-              <a:rPr lang="pt-BR" sz="2000" dirty="0" smtClean="0">
-                <a:latin typeface="Baskerville Old Face" pitchFamily="18" charset="0"/>
-              </a:rPr>
-              <a:t>criado do zero</a:t>
+              <a:t> Foi o primeiro layout a ser feito e o que levou mais tempo para produção, por ter sido totalmente criado do zero</a:t>
             </a:r>
           </a:p>
           <a:p>
@@ -4727,6 +4739,38 @@
             <a:endParaRPr lang="pt-BR" sz="2000" dirty="0">
               <a:latin typeface="Baskerville Old Face" pitchFamily="18" charset="0"/>
             </a:endParaRPr>
+          </a:p>
+        </p:txBody>
+      </p:sp>
+      <p:sp>
+        <p:nvSpPr>
+          <p:cNvPr id="4" name="CaixaDeTexto 3"/>
+          <p:cNvSpPr txBox="1"/>
+          <p:nvPr/>
+        </p:nvSpPr>
+        <p:spPr>
+          <a:xfrm>
+            <a:off x="2428860" y="6429396"/>
+            <a:ext cx="5450531" cy="253916"/>
+          </a:xfrm>
+          <a:prstGeom prst="rect">
+            <a:avLst/>
+          </a:prstGeom>
+          <a:noFill/>
+        </p:spPr>
+        <p:txBody>
+          <a:bodyPr wrap="none" rtlCol="0">
+            <a:spAutoFit/>
+          </a:bodyPr>
+          <a:lstStyle/>
+          <a:p>
+            <a:r>
+              <a:rPr lang="pt-BR" sz="1050" dirty="0" smtClean="0">
+                <a:hlinkClick r:id="rId3"/>
+              </a:rPr>
+              <a:t>https://www.figma.com/file/9EDyAvgRSpl14fQxS4CqdH/Game-Mania---Desktop?node-id=0%3A1</a:t>
+            </a:r>
+            <a:endParaRPr lang="pt-BR" sz="1050" dirty="0" smtClean="0"/>
           </a:p>
         </p:txBody>
       </p:sp>
@@ -4778,7 +4822,7 @@
         </p:blipFill>
         <p:spPr bwMode="auto">
           <a:xfrm>
-            <a:off x="6286512" y="285728"/>
+            <a:off x="7286644" y="285728"/>
             <a:ext cx="893968" cy="6319238"/>
           </a:xfrm>
           <a:prstGeom prst="rect">
@@ -4796,7 +4840,7 @@
         <p:spPr>
           <a:xfrm>
             <a:off x="1571604" y="1142984"/>
-            <a:ext cx="4286280" cy="5386090"/>
+            <a:ext cx="5000660" cy="4462760"/>
           </a:xfrm>
           <a:prstGeom prst="rect">
             <a:avLst/>
@@ -4898,6 +4942,38 @@
             <a:endParaRPr lang="pt-BR" sz="2000" dirty="0">
               <a:latin typeface="Baskerville Old Face" pitchFamily="18" charset="0"/>
             </a:endParaRPr>
+          </a:p>
+        </p:txBody>
+      </p:sp>
+      <p:sp>
+        <p:nvSpPr>
+          <p:cNvPr id="4" name="CaixaDeTexto 3"/>
+          <p:cNvSpPr txBox="1"/>
+          <p:nvPr/>
+        </p:nvSpPr>
+        <p:spPr>
+          <a:xfrm>
+            <a:off x="1285852" y="5786454"/>
+            <a:ext cx="5633273" cy="253916"/>
+          </a:xfrm>
+          <a:prstGeom prst="rect">
+            <a:avLst/>
+          </a:prstGeom>
+          <a:noFill/>
+        </p:spPr>
+        <p:txBody>
+          <a:bodyPr wrap="none" rtlCol="0">
+            <a:spAutoFit/>
+          </a:bodyPr>
+          <a:lstStyle/>
+          <a:p>
+            <a:r>
+              <a:rPr lang="pt-BR" sz="1050" dirty="0" smtClean="0">
+                <a:hlinkClick r:id="rId3"/>
+              </a:rPr>
+              <a:t>https://www.figma.com/file/AnZzR5px3NzqVipUARlb7K/GameMania---Smartphone?node-id=0%3A1</a:t>
+            </a:r>
+            <a:endParaRPr lang="pt-BR" sz="1050" dirty="0"/>
           </a:p>
         </p:txBody>
       </p:sp>
@@ -4942,7 +5018,7 @@
         </p:blipFill>
         <p:spPr bwMode="auto">
           <a:xfrm>
-            <a:off x="6000760" y="285728"/>
+            <a:off x="6643702" y="285728"/>
             <a:ext cx="1755429" cy="6322286"/>
           </a:xfrm>
           <a:prstGeom prst="rect">
@@ -5068,6 +5144,38 @@
             <a:endParaRPr lang="pt-BR" sz="2000" dirty="0">
               <a:latin typeface="Baskerville Old Face" pitchFamily="18" charset="0"/>
             </a:endParaRPr>
+          </a:p>
+        </p:txBody>
+      </p:sp>
+      <p:sp>
+        <p:nvSpPr>
+          <p:cNvPr id="4" name="CaixaDeTexto 3"/>
+          <p:cNvSpPr txBox="1"/>
+          <p:nvPr/>
+        </p:nvSpPr>
+        <p:spPr>
+          <a:xfrm>
+            <a:off x="1142976" y="5357826"/>
+            <a:ext cx="5320687" cy="253916"/>
+          </a:xfrm>
+          <a:prstGeom prst="rect">
+            <a:avLst/>
+          </a:prstGeom>
+          <a:noFill/>
+        </p:spPr>
+        <p:txBody>
+          <a:bodyPr wrap="none" rtlCol="0">
+            <a:spAutoFit/>
+          </a:bodyPr>
+          <a:lstStyle/>
+          <a:p>
+            <a:r>
+              <a:rPr lang="pt-BR" sz="1050" dirty="0" smtClean="0">
+                <a:hlinkClick r:id="rId3"/>
+              </a:rPr>
+              <a:t>https://www.figma.com/file/g5Sn5p2zeFZpK52tKKLdW1/GameMania---Tablet?node-id=2%3A2</a:t>
+            </a:r>
+            <a:endParaRPr lang="pt-BR" sz="1050" dirty="0"/>
           </a:p>
         </p:txBody>
       </p:sp>
@@ -5165,9 +5273,6 @@
               </a:rPr>
               <a:t> Design Responsivo para que o cliente possa navegar de qualquer dispositivo sem qualquer dificuldade.</a:t>
             </a:r>
-            <a:endParaRPr lang="pt-BR" sz="2000" dirty="0" smtClean="0">
-              <a:latin typeface="Baskerville Old Face" pitchFamily="18" charset="0"/>
-            </a:endParaRPr>
           </a:p>
           <a:p>
             <a:pPr algn="just">

</xml_diff>